<commit_message>
DataExpl Pipe Outlier Update
</commit_message>
<xml_diff>
--- a/assets/Infografia.pptx
+++ b/assets/Infografia.pptx
@@ -1084,7 +1084,7 @@
           <a:p>
             <a:fld id="{3D6DEB8E-57A5-4E24-A79E-0156C7376F47}" type="datetimeFigureOut">
               <a:rPr lang="es-ES" smtClean="0"/>
-              <a:t>11/06/2022</a:t>
+              <a:t>13/06/2022</a:t>
             </a:fld>
             <a:endParaRPr lang="es-ES"/>
           </a:p>
@@ -1254,7 +1254,7 @@
           <a:p>
             <a:fld id="{3D6DEB8E-57A5-4E24-A79E-0156C7376F47}" type="datetimeFigureOut">
               <a:rPr lang="es-ES" smtClean="0"/>
-              <a:t>11/06/2022</a:t>
+              <a:t>13/06/2022</a:t>
             </a:fld>
             <a:endParaRPr lang="es-ES"/>
           </a:p>
@@ -1434,7 +1434,7 @@
           <a:p>
             <a:fld id="{3D6DEB8E-57A5-4E24-A79E-0156C7376F47}" type="datetimeFigureOut">
               <a:rPr lang="es-ES" smtClean="0"/>
-              <a:t>11/06/2022</a:t>
+              <a:t>13/06/2022</a:t>
             </a:fld>
             <a:endParaRPr lang="es-ES"/>
           </a:p>
@@ -1604,7 +1604,7 @@
           <a:p>
             <a:fld id="{3D6DEB8E-57A5-4E24-A79E-0156C7376F47}" type="datetimeFigureOut">
               <a:rPr lang="es-ES" smtClean="0"/>
-              <a:t>11/06/2022</a:t>
+              <a:t>13/06/2022</a:t>
             </a:fld>
             <a:endParaRPr lang="es-ES"/>
           </a:p>
@@ -1848,7 +1848,7 @@
           <a:p>
             <a:fld id="{3D6DEB8E-57A5-4E24-A79E-0156C7376F47}" type="datetimeFigureOut">
               <a:rPr lang="es-ES" smtClean="0"/>
-              <a:t>11/06/2022</a:t>
+              <a:t>13/06/2022</a:t>
             </a:fld>
             <a:endParaRPr lang="es-ES"/>
           </a:p>
@@ -2080,7 +2080,7 @@
           <a:p>
             <a:fld id="{3D6DEB8E-57A5-4E24-A79E-0156C7376F47}" type="datetimeFigureOut">
               <a:rPr lang="es-ES" smtClean="0"/>
-              <a:t>11/06/2022</a:t>
+              <a:t>13/06/2022</a:t>
             </a:fld>
             <a:endParaRPr lang="es-ES"/>
           </a:p>
@@ -2447,7 +2447,7 @@
           <a:p>
             <a:fld id="{3D6DEB8E-57A5-4E24-A79E-0156C7376F47}" type="datetimeFigureOut">
               <a:rPr lang="es-ES" smtClean="0"/>
-              <a:t>11/06/2022</a:t>
+              <a:t>13/06/2022</a:t>
             </a:fld>
             <a:endParaRPr lang="es-ES"/>
           </a:p>
@@ -2565,7 +2565,7 @@
           <a:p>
             <a:fld id="{3D6DEB8E-57A5-4E24-A79E-0156C7376F47}" type="datetimeFigureOut">
               <a:rPr lang="es-ES" smtClean="0"/>
-              <a:t>11/06/2022</a:t>
+              <a:t>13/06/2022</a:t>
             </a:fld>
             <a:endParaRPr lang="es-ES"/>
           </a:p>
@@ -2660,7 +2660,7 @@
           <a:p>
             <a:fld id="{3D6DEB8E-57A5-4E24-A79E-0156C7376F47}" type="datetimeFigureOut">
               <a:rPr lang="es-ES" smtClean="0"/>
-              <a:t>11/06/2022</a:t>
+              <a:t>13/06/2022</a:t>
             </a:fld>
             <a:endParaRPr lang="es-ES"/>
           </a:p>
@@ -2937,7 +2937,7 @@
           <a:p>
             <a:fld id="{3D6DEB8E-57A5-4E24-A79E-0156C7376F47}" type="datetimeFigureOut">
               <a:rPr lang="es-ES" smtClean="0"/>
-              <a:t>11/06/2022</a:t>
+              <a:t>13/06/2022</a:t>
             </a:fld>
             <a:endParaRPr lang="es-ES"/>
           </a:p>
@@ -3194,7 +3194,7 @@
           <a:p>
             <a:fld id="{3D6DEB8E-57A5-4E24-A79E-0156C7376F47}" type="datetimeFigureOut">
               <a:rPr lang="es-ES" smtClean="0"/>
-              <a:t>11/06/2022</a:t>
+              <a:t>13/06/2022</a:t>
             </a:fld>
             <a:endParaRPr lang="es-ES"/>
           </a:p>
@@ -3407,7 +3407,7 @@
           <a:p>
             <a:fld id="{3D6DEB8E-57A5-4E24-A79E-0156C7376F47}" type="datetimeFigureOut">
               <a:rPr lang="es-ES" smtClean="0"/>
-              <a:t>11/06/2022</a:t>
+              <a:t>13/06/2022</a:t>
             </a:fld>
             <a:endParaRPr lang="es-ES"/>
           </a:p>
@@ -12237,6 +12237,223 @@
       </p:grpSpPr>
       <p:sp>
         <p:nvSpPr>
+          <p:cNvPr id="40" name="Rectangle: Rounded Corners 39">
+            <a:extLst>
+              <a:ext uri="{FF2B5EF4-FFF2-40B4-BE49-F238E27FC236}">
+                <a16:creationId xmlns:a16="http://schemas.microsoft.com/office/drawing/2014/main" id="{9A1713A5-7DCE-1918-3E7B-65A6C77743E7}"/>
+              </a:ext>
+            </a:extLst>
+          </p:cNvPr>
+          <p:cNvSpPr/>
+          <p:nvPr/>
+        </p:nvSpPr>
+        <p:spPr>
+          <a:xfrm>
+            <a:off x="10009177" y="3449629"/>
+            <a:ext cx="2367445" cy="1184032"/>
+          </a:xfrm>
+          <a:prstGeom prst="roundRect">
+            <a:avLst>
+              <a:gd name="adj" fmla="val 15699"/>
+            </a:avLst>
+          </a:prstGeom>
+          <a:noFill/>
+          <a:ln w="28575">
+            <a:solidFill>
+              <a:srgbClr val="2C8AE0">
+                <a:alpha val="50196"/>
+              </a:srgbClr>
+            </a:solidFill>
+          </a:ln>
+        </p:spPr>
+        <p:style>
+          <a:lnRef idx="2">
+            <a:schemeClr val="accent1">
+              <a:shade val="50000"/>
+            </a:schemeClr>
+          </a:lnRef>
+          <a:fillRef idx="1">
+            <a:schemeClr val="accent1"/>
+          </a:fillRef>
+          <a:effectRef idx="0">
+            <a:schemeClr val="accent1"/>
+          </a:effectRef>
+          <a:fontRef idx="minor">
+            <a:schemeClr val="lt1"/>
+          </a:fontRef>
+        </p:style>
+        <p:txBody>
+          <a:bodyPr numCol="2" rtlCol="0" anchor="ctr"/>
+          <a:lstStyle/>
+          <a:p>
+            <a:pPr algn="ctr"/>
+            <a:endParaRPr lang="es-ES" sz="900" i="0" dirty="0">
+              <a:solidFill>
+                <a:srgbClr val="89A2BD"/>
+              </a:solidFill>
+              <a:effectLst/>
+              <a:latin typeface="Helvetica Neue"/>
+            </a:endParaRPr>
+          </a:p>
+          <a:p>
+            <a:pPr algn="ctr"/>
+            <a:endParaRPr lang="es-ES" sz="900" dirty="0">
+              <a:solidFill>
+                <a:srgbClr val="89A2BD"/>
+              </a:solidFill>
+              <a:latin typeface="Helvetica Neue"/>
+            </a:endParaRPr>
+          </a:p>
+          <a:p>
+            <a:pPr algn="ctr"/>
+            <a:endParaRPr lang="es-ES" sz="900" dirty="0">
+              <a:solidFill>
+                <a:srgbClr val="89A2BD"/>
+              </a:solidFill>
+              <a:latin typeface="Helvetica Neue"/>
+            </a:endParaRPr>
+          </a:p>
+          <a:p>
+            <a:pPr algn="ctr"/>
+            <a:r>
+              <a:rPr lang="es-ES" sz="900" i="0" dirty="0">
+                <a:solidFill>
+                  <a:srgbClr val="89A2BD"/>
+                </a:solidFill>
+                <a:effectLst/>
+                <a:latin typeface="Helvetica Neue"/>
+              </a:rPr>
+              <a:t>cons_food_pc_05</a:t>
+            </a:r>
+          </a:p>
+          <a:p>
+            <a:pPr algn="ctr"/>
+            <a:r>
+              <a:rPr lang="es-ES" sz="900" i="0" dirty="0">
+                <a:solidFill>
+                  <a:srgbClr val="89A2BD"/>
+                </a:solidFill>
+                <a:effectLst/>
+                <a:latin typeface="Helvetica Neue"/>
+              </a:rPr>
+              <a:t>cons_tot_pc_05</a:t>
+            </a:r>
+          </a:p>
+          <a:p>
+            <a:pPr algn="ctr"/>
+            <a:r>
+              <a:rPr lang="es-ES" sz="900" i="0" dirty="0">
+                <a:solidFill>
+                  <a:srgbClr val="89A2BD"/>
+                </a:solidFill>
+                <a:effectLst/>
+                <a:latin typeface="Helvetica Neue"/>
+              </a:rPr>
+              <a:t>s3ap24_htime_h_05</a:t>
+            </a:r>
+          </a:p>
+          <a:p>
+            <a:pPr algn="ctr"/>
+            <a:r>
+              <a:rPr lang="es-ES" sz="900" i="0" dirty="0" err="1">
+                <a:solidFill>
+                  <a:srgbClr val="89A2BD"/>
+                </a:solidFill>
+                <a:effectLst/>
+                <a:latin typeface="Helvetica Neue"/>
+              </a:rPr>
+              <a:t>bweight</a:t>
+            </a:r>
+            <a:endParaRPr lang="es-ES" sz="900" i="0" dirty="0">
+              <a:solidFill>
+                <a:srgbClr val="89A2BD"/>
+              </a:solidFill>
+              <a:effectLst/>
+              <a:latin typeface="Helvetica Neue"/>
+            </a:endParaRPr>
+          </a:p>
+          <a:p>
+            <a:pPr algn="ctr"/>
+            <a:endParaRPr lang="es-ES" sz="900" i="0" dirty="0">
+              <a:solidFill>
+                <a:srgbClr val="89A2BD"/>
+              </a:solidFill>
+              <a:effectLst/>
+              <a:latin typeface="Helvetica Neue"/>
+            </a:endParaRPr>
+          </a:p>
+          <a:p>
+            <a:pPr algn="ctr"/>
+            <a:endParaRPr lang="es-ES" sz="900" dirty="0">
+              <a:solidFill>
+                <a:srgbClr val="89A2BD"/>
+              </a:solidFill>
+              <a:latin typeface="Helvetica Neue"/>
+            </a:endParaRPr>
+          </a:p>
+          <a:p>
+            <a:pPr algn="ctr"/>
+            <a:endParaRPr lang="es-ES" sz="900" i="0" dirty="0">
+              <a:solidFill>
+                <a:srgbClr val="89A2BD"/>
+              </a:solidFill>
+              <a:effectLst/>
+              <a:latin typeface="Helvetica Neue"/>
+            </a:endParaRPr>
+          </a:p>
+          <a:p>
+            <a:pPr algn="ctr"/>
+            <a:r>
+              <a:rPr lang="es-ES" sz="900" i="0" dirty="0">
+                <a:solidFill>
+                  <a:srgbClr val="89A2BD"/>
+                </a:solidFill>
+                <a:effectLst/>
+                <a:latin typeface="Helvetica Neue"/>
+              </a:rPr>
+              <a:t>com_control_05</a:t>
+            </a:r>
+          </a:p>
+          <a:p>
+            <a:pPr algn="ctr"/>
+            <a:r>
+              <a:rPr lang="es-ES" sz="900" i="0" dirty="0">
+                <a:solidFill>
+                  <a:srgbClr val="89A2BD"/>
+                </a:solidFill>
+                <a:effectLst/>
+                <a:latin typeface="Helvetica Neue"/>
+              </a:rPr>
+              <a:t>pranimalprot_f_05</a:t>
+            </a:r>
+          </a:p>
+          <a:p>
+            <a:pPr algn="ctr"/>
+            <a:r>
+              <a:rPr lang="es-ES" sz="900" i="0" dirty="0">
+                <a:solidFill>
+                  <a:srgbClr val="89A2BD"/>
+                </a:solidFill>
+                <a:effectLst/>
+                <a:latin typeface="Helvetica Neue"/>
+              </a:rPr>
+              <a:t>prfruitveg_f_05</a:t>
+            </a:r>
+          </a:p>
+          <a:p>
+            <a:pPr algn="ctr"/>
+            <a:endParaRPr lang="es-ES" sz="900" i="0" dirty="0">
+              <a:solidFill>
+                <a:srgbClr val="89A2BD"/>
+              </a:solidFill>
+              <a:effectLst/>
+              <a:latin typeface="Helvetica Neue"/>
+            </a:endParaRPr>
+          </a:p>
+        </p:txBody>
+      </p:sp>
+      <p:sp>
+        <p:nvSpPr>
           <p:cNvPr id="78" name="Rectangle: Rounded Corners 77">
             <a:extLst>
               <a:ext uri="{FF2B5EF4-FFF2-40B4-BE49-F238E27FC236}">
@@ -13976,7 +14193,7 @@
         </p:nvSpPr>
         <p:spPr>
           <a:xfrm>
-            <a:off x="10009177" y="5250761"/>
+            <a:off x="10009177" y="5369556"/>
             <a:ext cx="2367445" cy="1184032"/>
           </a:xfrm>
           <a:prstGeom prst="roundRect">
@@ -15708,7 +15925,7 @@
         </p:nvCxnSpPr>
         <p:spPr>
           <a:xfrm>
-            <a:off x="11192900" y="3080669"/>
+            <a:off x="11192900" y="2994301"/>
             <a:ext cx="0" cy="226800"/>
           </a:xfrm>
           <a:prstGeom prst="straightConnector1">
@@ -15752,7 +15969,7 @@
         </p:nvCxnSpPr>
         <p:spPr>
           <a:xfrm>
-            <a:off x="11192900" y="4458600"/>
+            <a:off x="11192900" y="4681337"/>
             <a:ext cx="0" cy="226800"/>
           </a:xfrm>
           <a:prstGeom prst="straightConnector1">
@@ -15952,7 +16169,7 @@
         </p:nvSpPr>
         <p:spPr>
           <a:xfrm>
-            <a:off x="10009178" y="4846315"/>
+            <a:off x="10009178" y="4965110"/>
             <a:ext cx="2367445" cy="738554"/>
           </a:xfrm>
           <a:prstGeom prst="roundRect">
@@ -16009,7 +16226,7 @@
         </p:nvSpPr>
         <p:spPr>
           <a:xfrm>
-            <a:off x="10009177" y="3519493"/>
+            <a:off x="10009177" y="3234391"/>
             <a:ext cx="2367445" cy="738554"/>
           </a:xfrm>
           <a:prstGeom prst="roundRect">

</xml_diff>